<commit_message>
Test for mobile subdomain
</commit_message>
<xml_diff>
--- a/workshop III..pptx
+++ b/workshop III..pptx
@@ -6215,8 +6215,9 @@
           </a:bodyPr>
           <a:lstStyle/>
           <a:p>
+            <a:pPr algn="ctr"/>
             <a:r>
-              <a:rPr lang="hu-HU" sz="8800" dirty="0" err="1">
+              <a:rPr lang="en-US" sz="8800" dirty="0" err="1">
                 <a:ln>
                   <a:solidFill>
                     <a:schemeClr val="tx1"/>
@@ -6226,7 +6227,7 @@
                   <a:schemeClr val="bg1"/>
                 </a:solidFill>
               </a:rPr>
-              <a:t>fileup.site</a:t>
+              <a:t>Funkciók</a:t>
             </a:r>
             <a:endParaRPr lang="hu-HU" sz="8800" dirty="0">
               <a:ln>
@@ -6717,8 +6718,8 @@
         </p:nvSpPr>
         <p:spPr>
           <a:xfrm>
-            <a:off x="4191396" y="2069111"/>
-            <a:ext cx="5147352" cy="2800767"/>
+            <a:off x="3729637" y="2705725"/>
+            <a:ext cx="5147352" cy="1446550"/>
           </a:xfrm>
           <a:prstGeom prst="rect">
             <a:avLst/>
@@ -6731,8 +6732,9 @@
           </a:bodyPr>
           <a:lstStyle/>
           <a:p>
+            <a:pPr algn="ctr"/>
             <a:r>
-              <a:rPr lang="hu-HU" sz="8800" dirty="0">
+              <a:rPr lang="en-US" sz="8800" dirty="0">
                 <a:ln>
                   <a:solidFill>
                     <a:schemeClr val="tx1"/>
@@ -6742,8 +6744,18 @@
                   <a:schemeClr val="bg1"/>
                 </a:solidFill>
               </a:rPr>
-              <a:t>Miért hoztuk? </a:t>
+              <a:t>Domain</a:t>
             </a:r>
+            <a:endParaRPr lang="hu-HU" sz="8800" dirty="0">
+              <a:ln>
+                <a:solidFill>
+                  <a:schemeClr val="tx1"/>
+                </a:solidFill>
+              </a:ln>
+              <a:solidFill>
+                <a:schemeClr val="bg1"/>
+              </a:solidFill>
+            </a:endParaRPr>
           </a:p>
         </p:txBody>
       </p:sp>
@@ -7223,8 +7235,8 @@
         </p:nvSpPr>
         <p:spPr>
           <a:xfrm>
-            <a:off x="5342563" y="2644170"/>
-            <a:ext cx="5147352" cy="1569660"/>
+            <a:off x="2748985" y="2644170"/>
+            <a:ext cx="7108656" cy="1569660"/>
           </a:xfrm>
           <a:prstGeom prst="rect">
             <a:avLst/>
@@ -7237,14 +7249,30 @@
           </a:bodyPr>
           <a:lstStyle/>
           <a:p>
+            <a:pPr algn="ctr"/>
             <a:r>
-              <a:rPr lang="hu-HU" sz="9600" dirty="0">
+              <a:rPr lang="en-US" sz="9600" dirty="0" err="1">
+                <a:ln>
+                  <a:solidFill>
+                    <a:schemeClr val="tx1"/>
+                  </a:solidFill>
+                </a:ln>
                 <a:solidFill>
                   <a:schemeClr val="bg1"/>
                 </a:solidFill>
               </a:rPr>
-              <a:t>3</a:t>
+              <a:t>Jövőkép</a:t>
             </a:r>
+            <a:endParaRPr lang="hu-HU" sz="9600" dirty="0">
+              <a:ln>
+                <a:solidFill>
+                  <a:schemeClr val="tx1"/>
+                </a:solidFill>
+              </a:ln>
+              <a:solidFill>
+                <a:schemeClr val="bg1"/>
+              </a:solidFill>
+            </a:endParaRPr>
           </a:p>
         </p:txBody>
       </p:sp>

</xml_diff>